<commit_message>
Continued with adding slide/lecture content.
</commit_message>
<xml_diff>
--- a/M3_Seurat_Processing/M3_Seurat.pptx
+++ b/M3_Seurat_Processing/M3_Seurat.pptx
@@ -4288,7 +4288,7 @@
         <p:spPr>
           <a:xfrm>
             <a:off x="2719100" y="4071830"/>
-            <a:ext cx="1735411" cy="369332"/>
+            <a:ext cx="1951368" cy="369332"/>
           </a:xfrm>
           <a:prstGeom prst="rect">
             <a:avLst/>
@@ -4303,7 +4303,7 @@
           <a:p>
             <a:r>
               <a:rPr lang="en-US" dirty="0"/>
-              <a:t>Enrich Metadata</a:t>
+              <a:t>Metadata Curation</a:t>
             </a:r>
           </a:p>
         </p:txBody>

</xml_diff>